<commit_message>
v0.0.32: Add comment card diagnostic logging for name/states analysis
</commit_message>
<xml_diff>
--- a/test_resources/Guide_Dogs_Test_Deck.pptx
+++ b/test_resources/Guide_Dogs_Test_Deck.pptx
@@ -112,12 +112,18 @@
       </a:defRPr>
     </a:lvl9pPr>
   </p:defaultTextStyle>
+  <p:extLst>
+    <p:ext uri="{EFAFB233-063F-42B5-8137-9DF3F51BA10A}">
+      <p15:sldGuideLst xmlns:p15="http://schemas.microsoft.com/office/powerpoint/2012/main"/>
+    </p:ext>
+  </p:extLst>
 </p:presentation>
 </file>
 
 <file path=ppt/authors.xml><?xml version="1.0" encoding="utf-8"?>
 <p188:authorLst xmlns:a="http://schemas.openxmlformats.org/drawingml/2006/main" xmlns:r="http://schemas.openxmlformats.org/officeDocument/2006/relationships" xmlns:p188="http://schemas.microsoft.com/office/powerpoint/2018/8/main">
   <p188:author id="{53CF2814-E671-958C-F932-8C6424710F6F}" name="Brett Humphrey" initials="BH" userId="29c2205a533adc02" providerId="Windows Live"/>
+  <p188:author id="{B72249CB-3892-C6F4-5165-3FF7AF885C30}" name="Brett Humphrey" initials="BH" userId="S::Brett@electro-jam.com::522a63b0-b642-4d4b-b7cc-a758571d848b" providerId="AD"/>
 </p188:authorLst>
 </file>
 
@@ -151,6 +157,20 @@
       <pc:sldMk cId="1678581151" sldId="257"/>
     </pc:sldMkLst>
     <p188:pos x="1905000" y="2540000"/>
+    <p188:replyLst>
+      <p188:reply id="{FCF535ED-317B-43A4-81B1-F73A9A86714F}" authorId="{B72249CB-3892-C6F4-5165-3FF7AF885C30}" created="2025-12-11T15:45:13.674">
+        <p188:txBody>
+          <a:bodyPr/>
+          <a:lstStyle/>
+          <a:p>
+            <a:r>
+              <a:rPr lang="en-US"/>
+              <a:t>Stuff to reply </a:t>
+            </a:r>
+          </a:p>
+        </p188:txBody>
+      </p188:reply>
+    </p188:replyLst>
     <p188:txBody>
       <a:bodyPr/>
       <a:lstStyle/>
@@ -201,7 +221,7 @@
       </a:p>
     </p188:txBody>
   </p188:cm>
-  <p188:cm id="{7A9231A5-BD49-407C-9B22-4718A61BEE4B}" authorId="{53CF2814-E671-958C-F932-8C6424710F6F}" created="2025-12-04T22:37:02.128">
+  <p188:cm id="{7A9231A5-BD49-407C-9B22-4718A61BEE4B}" authorId="{53CF2814-E671-958C-F932-8C6424710F6F}" status="resolved" created="2025-12-04T22:37:02.128" complete="100000">
     <pc:sldMkLst xmlns:pc="http://schemas.microsoft.com/office/powerpoint/2013/main/command">
       <pc:docMk/>
       <pc:sldMk cId="1659357164" sldId="258"/>
@@ -512,7 +532,7 @@
           <a:p>
             <a:fld id="{09EEBB50-B7EB-44BE-9779-AC849BD321CB}" type="datetimeFigureOut">
               <a:rPr lang="en-US" smtClean="0"/>
-              <a:t>12/4/2025</a:t>
+              <a:t>12/10/2025</a:t>
             </a:fld>
             <a:endParaRPr lang="en-US"/>
           </a:p>
@@ -710,7 +730,7 @@
           <a:p>
             <a:fld id="{09EEBB50-B7EB-44BE-9779-AC849BD321CB}" type="datetimeFigureOut">
               <a:rPr lang="en-US" smtClean="0"/>
-              <a:t>12/4/2025</a:t>
+              <a:t>12/10/2025</a:t>
             </a:fld>
             <a:endParaRPr lang="en-US"/>
           </a:p>
@@ -918,7 +938,7 @@
           <a:p>
             <a:fld id="{09EEBB50-B7EB-44BE-9779-AC849BD321CB}" type="datetimeFigureOut">
               <a:rPr lang="en-US" smtClean="0"/>
-              <a:t>12/4/2025</a:t>
+              <a:t>12/10/2025</a:t>
             </a:fld>
             <a:endParaRPr lang="en-US"/>
           </a:p>
@@ -1116,7 +1136,7 @@
           <a:p>
             <a:fld id="{09EEBB50-B7EB-44BE-9779-AC849BD321CB}" type="datetimeFigureOut">
               <a:rPr lang="en-US" smtClean="0"/>
-              <a:t>12/4/2025</a:t>
+              <a:t>12/10/2025</a:t>
             </a:fld>
             <a:endParaRPr lang="en-US"/>
           </a:p>
@@ -1314,7 +1334,7 @@
           <a:p>
             <a:fld id="{09EEBB50-B7EB-44BE-9779-AC849BD321CB}" type="datetimeFigureOut">
               <a:rPr lang="en-US" smtClean="0"/>
-              <a:t>12/4/2025</a:t>
+              <a:t>12/10/2025</a:t>
             </a:fld>
             <a:endParaRPr lang="en-US"/>
           </a:p>
@@ -1589,7 +1609,7 @@
           <a:p>
             <a:fld id="{09EEBB50-B7EB-44BE-9779-AC849BD321CB}" type="datetimeFigureOut">
               <a:rPr lang="en-US" smtClean="0"/>
-              <a:t>12/4/2025</a:t>
+              <a:t>12/10/2025</a:t>
             </a:fld>
             <a:endParaRPr lang="en-US"/>
           </a:p>
@@ -1854,7 +1874,7 @@
           <a:p>
             <a:fld id="{09EEBB50-B7EB-44BE-9779-AC849BD321CB}" type="datetimeFigureOut">
               <a:rPr lang="en-US" smtClean="0"/>
-              <a:t>12/4/2025</a:t>
+              <a:t>12/10/2025</a:t>
             </a:fld>
             <a:endParaRPr lang="en-US"/>
           </a:p>
@@ -2266,7 +2286,7 @@
           <a:p>
             <a:fld id="{09EEBB50-B7EB-44BE-9779-AC849BD321CB}" type="datetimeFigureOut">
               <a:rPr lang="en-US" smtClean="0"/>
-              <a:t>12/4/2025</a:t>
+              <a:t>12/10/2025</a:t>
             </a:fld>
             <a:endParaRPr lang="en-US"/>
           </a:p>
@@ -2407,7 +2427,7 @@
           <a:p>
             <a:fld id="{09EEBB50-B7EB-44BE-9779-AC849BD321CB}" type="datetimeFigureOut">
               <a:rPr lang="en-US" smtClean="0"/>
-              <a:t>12/4/2025</a:t>
+              <a:t>12/10/2025</a:t>
             </a:fld>
             <a:endParaRPr lang="en-US"/>
           </a:p>
@@ -2520,7 +2540,7 @@
           <a:p>
             <a:fld id="{09EEBB50-B7EB-44BE-9779-AC849BD321CB}" type="datetimeFigureOut">
               <a:rPr lang="en-US" smtClean="0"/>
-              <a:t>12/4/2025</a:t>
+              <a:t>12/10/2025</a:t>
             </a:fld>
             <a:endParaRPr lang="en-US"/>
           </a:p>
@@ -2831,7 +2851,7 @@
           <a:p>
             <a:fld id="{09EEBB50-B7EB-44BE-9779-AC849BD321CB}" type="datetimeFigureOut">
               <a:rPr lang="en-US" smtClean="0"/>
-              <a:t>12/4/2025</a:t>
+              <a:t>12/10/2025</a:t>
             </a:fld>
             <a:endParaRPr lang="en-US"/>
           </a:p>
@@ -3119,7 +3139,7 @@
           <a:p>
             <a:fld id="{09EEBB50-B7EB-44BE-9779-AC849BD321CB}" type="datetimeFigureOut">
               <a:rPr lang="en-US" smtClean="0"/>
-              <a:t>12/4/2025</a:t>
+              <a:t>12/10/2025</a:t>
             </a:fld>
             <a:endParaRPr lang="en-US"/>
           </a:p>
@@ -3360,7 +3380,7 @@
           <a:p>
             <a:fld id="{09EEBB50-B7EB-44BE-9779-AC849BD321CB}" type="datetimeFigureOut">
               <a:rPr lang="en-US" smtClean="0"/>
-              <a:t>12/4/2025</a:t>
+              <a:t>12/10/2025</a:t>
             </a:fld>
             <a:endParaRPr lang="en-US"/>
           </a:p>
@@ -4015,7 +4035,7 @@
         </p:nvGraphicFramePr>
         <p:xfrm>
           <a:off x="635000" y="1524000"/>
-          <a:ext cx="7874000" cy="4064000"/>
+          <a:ext cx="7874001" cy="4629576"/>
         </p:xfrm>
         <a:graphic>
           <a:graphicData uri="http://schemas.openxmlformats.org/drawingml/2006/table">

</xml_diff>

<commit_message>
v0.0.34: Fix comment detection with name-based fallback
</commit_message>
<xml_diff>
--- a/test_resources/Guide_Dogs_Test_Deck.pptx
+++ b/test_resources/Guide_Dogs_Test_Deck.pptx
@@ -4,6 +4,9 @@
   <p:sldMasterIdLst>
     <p:sldMasterId id="2147483648" r:id="rId1"/>
   </p:sldMasterIdLst>
+  <p:notesMasterIdLst>
+    <p:notesMasterId r:id="rId11"/>
+  </p:notesMasterIdLst>
   <p:sldIdLst>
     <p:sldId id="256" r:id="rId2"/>
     <p:sldId id="257" r:id="rId3"/>
@@ -383,6 +386,439 @@
     </p188:txBody>
   </p188:cm>
 </p188:cmLst>
+</file>
+
+<file path=ppt/notesMasters/notesMaster1.xml><?xml version="1.0" encoding="utf-8"?>
+<p:notesMaster xmlns:a="http://schemas.openxmlformats.org/drawingml/2006/main" xmlns:r="http://schemas.openxmlformats.org/officeDocument/2006/relationships" xmlns:p="http://schemas.openxmlformats.org/presentationml/2006/main">
+  <p:cSld>
+    <p:bg>
+      <p:bgRef idx="1001">
+        <a:schemeClr val="bg1"/>
+      </p:bgRef>
+    </p:bg>
+    <p:spTree>
+      <p:nvGrpSpPr>
+        <p:cNvPr id="1" name=""/>
+        <p:cNvGrpSpPr/>
+        <p:nvPr/>
+      </p:nvGrpSpPr>
+      <p:grpSpPr>
+        <a:xfrm>
+          <a:off x="0" y="0"/>
+          <a:ext cx="0" cy="0"/>
+          <a:chOff x="0" y="0"/>
+          <a:chExt cx="0" cy="0"/>
+        </a:xfrm>
+      </p:grpSpPr>
+      <p:sp>
+        <p:nvSpPr>
+          <p:cNvPr id="2" name="Header Placeholder 1"/>
+          <p:cNvSpPr>
+            <a:spLocks noGrp="1"/>
+          </p:cNvSpPr>
+          <p:nvPr>
+            <p:ph type="hdr" sz="quarter"/>
+          </p:nvPr>
+        </p:nvSpPr>
+        <p:spPr>
+          <a:xfrm>
+            <a:off x="0" y="0"/>
+            <a:ext cx="2971800" cy="458788"/>
+          </a:xfrm>
+          <a:prstGeom prst="rect">
+            <a:avLst/>
+          </a:prstGeom>
+        </p:spPr>
+        <p:txBody>
+          <a:bodyPr vert="horz" lIns="91440" tIns="45720" rIns="91440" bIns="45720" rtlCol="0"/>
+          <a:lstStyle>
+            <a:lvl1pPr algn="l">
+              <a:defRPr sz="1200"/>
+            </a:lvl1pPr>
+          </a:lstStyle>
+          <a:p>
+            <a:endParaRPr lang="en-US"/>
+          </a:p>
+        </p:txBody>
+      </p:sp>
+      <p:sp>
+        <p:nvSpPr>
+          <p:cNvPr id="3" name="Date Placeholder 2"/>
+          <p:cNvSpPr>
+            <a:spLocks noGrp="1"/>
+          </p:cNvSpPr>
+          <p:nvPr>
+            <p:ph type="dt" idx="1"/>
+          </p:nvPr>
+        </p:nvSpPr>
+        <p:spPr>
+          <a:xfrm>
+            <a:off x="3884613" y="0"/>
+            <a:ext cx="2971800" cy="458788"/>
+          </a:xfrm>
+          <a:prstGeom prst="rect">
+            <a:avLst/>
+          </a:prstGeom>
+        </p:spPr>
+        <p:txBody>
+          <a:bodyPr vert="horz" lIns="91440" tIns="45720" rIns="91440" bIns="45720" rtlCol="0"/>
+          <a:lstStyle>
+            <a:lvl1pPr algn="r">
+              <a:defRPr sz="1200"/>
+            </a:lvl1pPr>
+          </a:lstStyle>
+          <a:p>
+            <a:fld id="{583F1CBD-96CF-4072-8DC3-C715CAA4EC76}" type="datetimeFigureOut">
+              <a:rPr lang="en-US" smtClean="0"/>
+              <a:t>12/11/2025</a:t>
+            </a:fld>
+            <a:endParaRPr lang="en-US"/>
+          </a:p>
+        </p:txBody>
+      </p:sp>
+      <p:sp>
+        <p:nvSpPr>
+          <p:cNvPr id="4" name="Slide Image Placeholder 3"/>
+          <p:cNvSpPr>
+            <a:spLocks noGrp="1" noRot="1" noChangeAspect="1"/>
+          </p:cNvSpPr>
+          <p:nvPr>
+            <p:ph type="sldImg" idx="2"/>
+          </p:nvPr>
+        </p:nvSpPr>
+        <p:spPr>
+          <a:xfrm>
+            <a:off x="685800" y="1143000"/>
+            <a:ext cx="5486400" cy="3086100"/>
+          </a:xfrm>
+          <a:prstGeom prst="rect">
+            <a:avLst/>
+          </a:prstGeom>
+          <a:noFill/>
+          <a:ln w="12700">
+            <a:solidFill>
+              <a:prstClr val="black"/>
+            </a:solidFill>
+          </a:ln>
+        </p:spPr>
+        <p:txBody>
+          <a:bodyPr vert="horz" lIns="91440" tIns="45720" rIns="91440" bIns="45720" rtlCol="0" anchor="ctr"/>
+          <a:lstStyle/>
+          <a:p>
+            <a:endParaRPr lang="en-US"/>
+          </a:p>
+        </p:txBody>
+      </p:sp>
+      <p:sp>
+        <p:nvSpPr>
+          <p:cNvPr id="5" name="Notes Placeholder 4"/>
+          <p:cNvSpPr>
+            <a:spLocks noGrp="1"/>
+          </p:cNvSpPr>
+          <p:nvPr>
+            <p:ph type="body" sz="quarter" idx="3"/>
+          </p:nvPr>
+        </p:nvSpPr>
+        <p:spPr>
+          <a:xfrm>
+            <a:off x="685800" y="4400550"/>
+            <a:ext cx="5486400" cy="3600450"/>
+          </a:xfrm>
+          <a:prstGeom prst="rect">
+            <a:avLst/>
+          </a:prstGeom>
+        </p:spPr>
+        <p:txBody>
+          <a:bodyPr vert="horz" lIns="91440" tIns="45720" rIns="91440" bIns="45720" rtlCol="0"/>
+          <a:lstStyle/>
+          <a:p>
+            <a:pPr lvl="0"/>
+            <a:r>
+              <a:rPr lang="en-US"/>
+              <a:t>Click to edit Master text styles</a:t>
+            </a:r>
+          </a:p>
+          <a:p>
+            <a:pPr lvl="1"/>
+            <a:r>
+              <a:rPr lang="en-US"/>
+              <a:t>Second level</a:t>
+            </a:r>
+          </a:p>
+          <a:p>
+            <a:pPr lvl="2"/>
+            <a:r>
+              <a:rPr lang="en-US"/>
+              <a:t>Third level</a:t>
+            </a:r>
+          </a:p>
+          <a:p>
+            <a:pPr lvl="3"/>
+            <a:r>
+              <a:rPr lang="en-US"/>
+              <a:t>Fourth level</a:t>
+            </a:r>
+          </a:p>
+          <a:p>
+            <a:pPr lvl="4"/>
+            <a:r>
+              <a:rPr lang="en-US"/>
+              <a:t>Fifth level</a:t>
+            </a:r>
+          </a:p>
+        </p:txBody>
+      </p:sp>
+      <p:sp>
+        <p:nvSpPr>
+          <p:cNvPr id="6" name="Footer Placeholder 5"/>
+          <p:cNvSpPr>
+            <a:spLocks noGrp="1"/>
+          </p:cNvSpPr>
+          <p:nvPr>
+            <p:ph type="ftr" sz="quarter" idx="4"/>
+          </p:nvPr>
+        </p:nvSpPr>
+        <p:spPr>
+          <a:xfrm>
+            <a:off x="0" y="8685213"/>
+            <a:ext cx="2971800" cy="458787"/>
+          </a:xfrm>
+          <a:prstGeom prst="rect">
+            <a:avLst/>
+          </a:prstGeom>
+        </p:spPr>
+        <p:txBody>
+          <a:bodyPr vert="horz" lIns="91440" tIns="45720" rIns="91440" bIns="45720" rtlCol="0" anchor="b"/>
+          <a:lstStyle>
+            <a:lvl1pPr algn="l">
+              <a:defRPr sz="1200"/>
+            </a:lvl1pPr>
+          </a:lstStyle>
+          <a:p>
+            <a:endParaRPr lang="en-US"/>
+          </a:p>
+        </p:txBody>
+      </p:sp>
+      <p:sp>
+        <p:nvSpPr>
+          <p:cNvPr id="7" name="Slide Number Placeholder 6"/>
+          <p:cNvSpPr>
+            <a:spLocks noGrp="1"/>
+          </p:cNvSpPr>
+          <p:nvPr>
+            <p:ph type="sldNum" sz="quarter" idx="5"/>
+          </p:nvPr>
+        </p:nvSpPr>
+        <p:spPr>
+          <a:xfrm>
+            <a:off x="3884613" y="8685213"/>
+            <a:ext cx="2971800" cy="458787"/>
+          </a:xfrm>
+          <a:prstGeom prst="rect">
+            <a:avLst/>
+          </a:prstGeom>
+        </p:spPr>
+        <p:txBody>
+          <a:bodyPr vert="horz" lIns="91440" tIns="45720" rIns="91440" bIns="45720" rtlCol="0" anchor="b"/>
+          <a:lstStyle>
+            <a:lvl1pPr algn="r">
+              <a:defRPr sz="1200"/>
+            </a:lvl1pPr>
+          </a:lstStyle>
+          <a:p>
+            <a:fld id="{9D2E4F0C-A2D9-473C-B5DC-CA499C91B12F}" type="slidenum">
+              <a:rPr lang="en-US" smtClean="0"/>
+              <a:t>‹#›</a:t>
+            </a:fld>
+            <a:endParaRPr lang="en-US"/>
+          </a:p>
+        </p:txBody>
+      </p:sp>
+    </p:spTree>
+    <p:extLst>
+      <p:ext uri="{BB962C8B-B14F-4D97-AF65-F5344CB8AC3E}">
+        <p14:creationId xmlns:p14="http://schemas.microsoft.com/office/powerpoint/2010/main" val="890753425"/>
+      </p:ext>
+    </p:extLst>
+  </p:cSld>
+  <p:clrMap bg1="lt1" tx1="dk1" bg2="lt2" tx2="dk2" accent1="accent1" accent2="accent2" accent3="accent3" accent4="accent4" accent5="accent5" accent6="accent6" hlink="hlink" folHlink="folHlink"/>
+  <p:notesStyle>
+    <a:lvl1pPr marL="0" algn="l" defTabSz="914400" rtl="0" eaLnBrk="1" latinLnBrk="0" hangingPunct="1">
+      <a:defRPr sz="1200" kern="1200">
+        <a:solidFill>
+          <a:schemeClr val="tx1"/>
+        </a:solidFill>
+        <a:latin typeface="+mn-lt"/>
+        <a:ea typeface="+mn-ea"/>
+        <a:cs typeface="+mn-cs"/>
+      </a:defRPr>
+    </a:lvl1pPr>
+    <a:lvl2pPr marL="457200" algn="l" defTabSz="914400" rtl="0" eaLnBrk="1" latinLnBrk="0" hangingPunct="1">
+      <a:defRPr sz="1200" kern="1200">
+        <a:solidFill>
+          <a:schemeClr val="tx1"/>
+        </a:solidFill>
+        <a:latin typeface="+mn-lt"/>
+        <a:ea typeface="+mn-ea"/>
+        <a:cs typeface="+mn-cs"/>
+      </a:defRPr>
+    </a:lvl2pPr>
+    <a:lvl3pPr marL="914400" algn="l" defTabSz="914400" rtl="0" eaLnBrk="1" latinLnBrk="0" hangingPunct="1">
+      <a:defRPr sz="1200" kern="1200">
+        <a:solidFill>
+          <a:schemeClr val="tx1"/>
+        </a:solidFill>
+        <a:latin typeface="+mn-lt"/>
+        <a:ea typeface="+mn-ea"/>
+        <a:cs typeface="+mn-cs"/>
+      </a:defRPr>
+    </a:lvl3pPr>
+    <a:lvl4pPr marL="1371600" algn="l" defTabSz="914400" rtl="0" eaLnBrk="1" latinLnBrk="0" hangingPunct="1">
+      <a:defRPr sz="1200" kern="1200">
+        <a:solidFill>
+          <a:schemeClr val="tx1"/>
+        </a:solidFill>
+        <a:latin typeface="+mn-lt"/>
+        <a:ea typeface="+mn-ea"/>
+        <a:cs typeface="+mn-cs"/>
+      </a:defRPr>
+    </a:lvl4pPr>
+    <a:lvl5pPr marL="1828800" algn="l" defTabSz="914400" rtl="0" eaLnBrk="1" latinLnBrk="0" hangingPunct="1">
+      <a:defRPr sz="1200" kern="1200">
+        <a:solidFill>
+          <a:schemeClr val="tx1"/>
+        </a:solidFill>
+        <a:latin typeface="+mn-lt"/>
+        <a:ea typeface="+mn-ea"/>
+        <a:cs typeface="+mn-cs"/>
+      </a:defRPr>
+    </a:lvl5pPr>
+    <a:lvl6pPr marL="2286000" algn="l" defTabSz="914400" rtl="0" eaLnBrk="1" latinLnBrk="0" hangingPunct="1">
+      <a:defRPr sz="1200" kern="1200">
+        <a:solidFill>
+          <a:schemeClr val="tx1"/>
+        </a:solidFill>
+        <a:latin typeface="+mn-lt"/>
+        <a:ea typeface="+mn-ea"/>
+        <a:cs typeface="+mn-cs"/>
+      </a:defRPr>
+    </a:lvl6pPr>
+    <a:lvl7pPr marL="2743200" algn="l" defTabSz="914400" rtl="0" eaLnBrk="1" latinLnBrk="0" hangingPunct="1">
+      <a:defRPr sz="1200" kern="1200">
+        <a:solidFill>
+          <a:schemeClr val="tx1"/>
+        </a:solidFill>
+        <a:latin typeface="+mn-lt"/>
+        <a:ea typeface="+mn-ea"/>
+        <a:cs typeface="+mn-cs"/>
+      </a:defRPr>
+    </a:lvl7pPr>
+    <a:lvl8pPr marL="3200400" algn="l" defTabSz="914400" rtl="0" eaLnBrk="1" latinLnBrk="0" hangingPunct="1">
+      <a:defRPr sz="1200" kern="1200">
+        <a:solidFill>
+          <a:schemeClr val="tx1"/>
+        </a:solidFill>
+        <a:latin typeface="+mn-lt"/>
+        <a:ea typeface="+mn-ea"/>
+        <a:cs typeface="+mn-cs"/>
+      </a:defRPr>
+    </a:lvl8pPr>
+    <a:lvl9pPr marL="3657600" algn="l" defTabSz="914400" rtl="0" eaLnBrk="1" latinLnBrk="0" hangingPunct="1">
+      <a:defRPr sz="1200" kern="1200">
+        <a:solidFill>
+          <a:schemeClr val="tx1"/>
+        </a:solidFill>
+        <a:latin typeface="+mn-lt"/>
+        <a:ea typeface="+mn-ea"/>
+        <a:cs typeface="+mn-cs"/>
+      </a:defRPr>
+    </a:lvl9pPr>
+  </p:notesStyle>
+</p:notesMaster>
+</file>
+
+<file path=ppt/notesSlides/notesSlide1.xml><?xml version="1.0" encoding="utf-8"?>
+<p:notes xmlns:a="http://schemas.openxmlformats.org/drawingml/2006/main" xmlns:r="http://schemas.openxmlformats.org/officeDocument/2006/relationships" xmlns:p="http://schemas.openxmlformats.org/presentationml/2006/main">
+  <p:cSld>
+    <p:spTree>
+      <p:nvGrpSpPr>
+        <p:cNvPr id="1" name=""/>
+        <p:cNvGrpSpPr/>
+        <p:nvPr/>
+      </p:nvGrpSpPr>
+      <p:grpSpPr>
+        <a:xfrm>
+          <a:off x="0" y="0"/>
+          <a:ext cx="0" cy="0"/>
+          <a:chOff x="0" y="0"/>
+          <a:chExt cx="0" cy="0"/>
+        </a:xfrm>
+      </p:grpSpPr>
+      <p:sp>
+        <p:nvSpPr>
+          <p:cNvPr id="2" name="Slide Image Placeholder 1"/>
+          <p:cNvSpPr>
+            <a:spLocks noGrp="1" noRot="1" noChangeAspect="1"/>
+          </p:cNvSpPr>
+          <p:nvPr>
+            <p:ph type="sldImg"/>
+          </p:nvPr>
+        </p:nvSpPr>
+        <p:spPr/>
+      </p:sp>
+      <p:sp>
+        <p:nvSpPr>
+          <p:cNvPr id="3" name="Notes Placeholder 2"/>
+          <p:cNvSpPr>
+            <a:spLocks noGrp="1"/>
+          </p:cNvSpPr>
+          <p:nvPr>
+            <p:ph type="body" idx="1"/>
+          </p:nvPr>
+        </p:nvSpPr>
+        <p:spPr/>
+        <p:txBody>
+          <a:bodyPr/>
+          <a:lstStyle/>
+          <a:p>
+            <a:endParaRPr lang="en-US" dirty="0"/>
+          </a:p>
+        </p:txBody>
+      </p:sp>
+      <p:sp>
+        <p:nvSpPr>
+          <p:cNvPr id="4" name="Slide Number Placeholder 3"/>
+          <p:cNvSpPr>
+            <a:spLocks noGrp="1"/>
+          </p:cNvSpPr>
+          <p:nvPr>
+            <p:ph type="sldNum" sz="quarter" idx="5"/>
+          </p:nvPr>
+        </p:nvSpPr>
+        <p:spPr/>
+        <p:txBody>
+          <a:bodyPr/>
+          <a:lstStyle/>
+          <a:p>
+            <a:fld id="{9D2E4F0C-A2D9-473C-B5DC-CA499C91B12F}" type="slidenum">
+              <a:rPr lang="en-US" smtClean="0"/>
+              <a:t>1</a:t>
+            </a:fld>
+            <a:endParaRPr lang="en-US"/>
+          </a:p>
+        </p:txBody>
+      </p:sp>
+    </p:spTree>
+    <p:extLst>
+      <p:ext uri="{BB962C8B-B14F-4D97-AF65-F5344CB8AC3E}">
+        <p14:creationId xmlns:p14="http://schemas.microsoft.com/office/powerpoint/2010/main" val="969289175"/>
+      </p:ext>
+    </p:extLst>
+  </p:cSld>
+  <p:clrMapOvr>
+    <a:masterClrMapping/>
+  </p:clrMapOvr>
+</p:notes>
 </file>
 
 <file path=ppt/slideLayouts/slideLayout1.xml><?xml version="1.0" encoding="utf-8"?>
@@ -3867,7 +4303,7 @@
   </p:clrMapOvr>
   <p:extLst>
     <p:ext uri="{6950BFC3-D8DA-4A85-94F7-54DA5524770B}">
-      <p188:commentRel xmlns:p188="http://schemas.microsoft.com/office/powerpoint/2018/8/main" r:id="rId2"/>
+      <p188:commentRel xmlns:p188="http://schemas.microsoft.com/office/powerpoint/2018/8/main" r:id="rId3"/>
     </p:ext>
   </p:extLst>
 </p:sld>
@@ -5386,4 +5822,319 @@
     </a:ext>
   </a:extLst>
 </a:theme>
+</file>
+
+<file path=ppt/theme/theme2.xml><?xml version="1.0" encoding="utf-8"?>
+<a:theme xmlns:a="http://schemas.openxmlformats.org/drawingml/2006/main" name="Office Theme">
+  <a:themeElements>
+    <a:clrScheme name="Office">
+      <a:dk1>
+        <a:sysClr val="windowText" lastClr="000000"/>
+      </a:dk1>
+      <a:lt1>
+        <a:sysClr val="window" lastClr="FFFFFF"/>
+      </a:lt1>
+      <a:dk2>
+        <a:srgbClr val="0E2841"/>
+      </a:dk2>
+      <a:lt2>
+        <a:srgbClr val="E8E8E8"/>
+      </a:lt2>
+      <a:accent1>
+        <a:srgbClr val="156082"/>
+      </a:accent1>
+      <a:accent2>
+        <a:srgbClr val="E97132"/>
+      </a:accent2>
+      <a:accent3>
+        <a:srgbClr val="196B24"/>
+      </a:accent3>
+      <a:accent4>
+        <a:srgbClr val="0F9ED5"/>
+      </a:accent4>
+      <a:accent5>
+        <a:srgbClr val="A02B93"/>
+      </a:accent5>
+      <a:accent6>
+        <a:srgbClr val="4EA72E"/>
+      </a:accent6>
+      <a:hlink>
+        <a:srgbClr val="467886"/>
+      </a:hlink>
+      <a:folHlink>
+        <a:srgbClr val="96607D"/>
+      </a:folHlink>
+    </a:clrScheme>
+    <a:fontScheme name="Office">
+      <a:majorFont>
+        <a:latin typeface="Aptos Display" panose="02110004020202020204"/>
+        <a:ea typeface=""/>
+        <a:cs typeface=""/>
+        <a:font script="Jpan" typeface="游ゴシック Light"/>
+        <a:font script="Hang" typeface="맑은 고딕"/>
+        <a:font script="Hans" typeface="等线 Light"/>
+        <a:font script="Hant" typeface="新細明體"/>
+        <a:font script="Arab" typeface="Times New Roman"/>
+        <a:font script="Hebr" typeface="Times New Roman"/>
+        <a:font script="Thai" typeface="Angsana New"/>
+        <a:font script="Ethi" typeface="Nyala"/>
+        <a:font script="Beng" typeface="Vrinda"/>
+        <a:font script="Gujr" typeface="Shruti"/>
+        <a:font script="Khmr" typeface="MoolBoran"/>
+        <a:font script="Knda" typeface="Tunga"/>
+        <a:font script="Guru" typeface="Raavi"/>
+        <a:font script="Cans" typeface="Euphemia"/>
+        <a:font script="Cher" typeface="Plantagenet Cherokee"/>
+        <a:font script="Yiii" typeface="Microsoft Yi Baiti"/>
+        <a:font script="Tibt" typeface="Microsoft Himalaya"/>
+        <a:font script="Thaa" typeface="MV Boli"/>
+        <a:font script="Deva" typeface="Mangal"/>
+        <a:font script="Telu" typeface="Gautami"/>
+        <a:font script="Taml" typeface="Latha"/>
+        <a:font script="Syrc" typeface="Estrangelo Edessa"/>
+        <a:font script="Orya" typeface="Kalinga"/>
+        <a:font script="Mlym" typeface="Kartika"/>
+        <a:font script="Laoo" typeface="DokChampa"/>
+        <a:font script="Sinh" typeface="Iskoola Pota"/>
+        <a:font script="Mong" typeface="Mongolian Baiti"/>
+        <a:font script="Viet" typeface="Times New Roman"/>
+        <a:font script="Uigh" typeface="Microsoft Uighur"/>
+        <a:font script="Geor" typeface="Sylfaen"/>
+        <a:font script="Armn" typeface="Arial"/>
+        <a:font script="Bugi" typeface="Leelawadee UI"/>
+        <a:font script="Bopo" typeface="Microsoft JhengHei"/>
+        <a:font script="Java" typeface="Javanese Text"/>
+        <a:font script="Lisu" typeface="Segoe UI"/>
+        <a:font script="Mymr" typeface="Myanmar Text"/>
+        <a:font script="Nkoo" typeface="Ebrima"/>
+        <a:font script="Olck" typeface="Nirmala UI"/>
+        <a:font script="Osma" typeface="Ebrima"/>
+        <a:font script="Phag" typeface="Phagspa"/>
+        <a:font script="Syrn" typeface="Estrangelo Edessa"/>
+        <a:font script="Syrj" typeface="Estrangelo Edessa"/>
+        <a:font script="Syre" typeface="Estrangelo Edessa"/>
+        <a:font script="Sora" typeface="Nirmala UI"/>
+        <a:font script="Tale" typeface="Microsoft Tai Le"/>
+        <a:font script="Talu" typeface="Microsoft New Tai Lue"/>
+        <a:font script="Tfng" typeface="Ebrima"/>
+      </a:majorFont>
+      <a:minorFont>
+        <a:latin typeface="Aptos" panose="02110004020202020204"/>
+        <a:ea typeface=""/>
+        <a:cs typeface=""/>
+        <a:font script="Jpan" typeface="游ゴシック"/>
+        <a:font script="Hang" typeface="맑은 고딕"/>
+        <a:font script="Hans" typeface="等线"/>
+        <a:font script="Hant" typeface="新細明體"/>
+        <a:font script="Arab" typeface="Arial"/>
+        <a:font script="Hebr" typeface="Arial"/>
+        <a:font script="Thai" typeface="Cordia New"/>
+        <a:font script="Ethi" typeface="Nyala"/>
+        <a:font script="Beng" typeface="Vrinda"/>
+        <a:font script="Gujr" typeface="Shruti"/>
+        <a:font script="Khmr" typeface="DaunPenh"/>
+        <a:font script="Knda" typeface="Tunga"/>
+        <a:font script="Guru" typeface="Raavi"/>
+        <a:font script="Cans" typeface="Euphemia"/>
+        <a:font script="Cher" typeface="Plantagenet Cherokee"/>
+        <a:font script="Yiii" typeface="Microsoft Yi Baiti"/>
+        <a:font script="Tibt" typeface="Microsoft Himalaya"/>
+        <a:font script="Thaa" typeface="MV Boli"/>
+        <a:font script="Deva" typeface="Mangal"/>
+        <a:font script="Telu" typeface="Gautami"/>
+        <a:font script="Taml" typeface="Latha"/>
+        <a:font script="Syrc" typeface="Estrangelo Edessa"/>
+        <a:font script="Orya" typeface="Kalinga"/>
+        <a:font script="Mlym" typeface="Kartika"/>
+        <a:font script="Laoo" typeface="DokChampa"/>
+        <a:font script="Sinh" typeface="Iskoola Pota"/>
+        <a:font script="Mong" typeface="Mongolian Baiti"/>
+        <a:font script="Viet" typeface="Arial"/>
+        <a:font script="Uigh" typeface="Microsoft Uighur"/>
+        <a:font script="Geor" typeface="Sylfaen"/>
+        <a:font script="Armn" typeface="Arial"/>
+        <a:font script="Bugi" typeface="Leelawadee UI"/>
+        <a:font script="Bopo" typeface="Microsoft JhengHei"/>
+        <a:font script="Java" typeface="Javanese Text"/>
+        <a:font script="Lisu" typeface="Segoe UI"/>
+        <a:font script="Mymr" typeface="Myanmar Text"/>
+        <a:font script="Nkoo" typeface="Ebrima"/>
+        <a:font script="Olck" typeface="Nirmala UI"/>
+        <a:font script="Osma" typeface="Ebrima"/>
+        <a:font script="Phag" typeface="Phagspa"/>
+        <a:font script="Syrn" typeface="Estrangelo Edessa"/>
+        <a:font script="Syrj" typeface="Estrangelo Edessa"/>
+        <a:font script="Syre" typeface="Estrangelo Edessa"/>
+        <a:font script="Sora" typeface="Nirmala UI"/>
+        <a:font script="Tale" typeface="Microsoft Tai Le"/>
+        <a:font script="Talu" typeface="Microsoft New Tai Lue"/>
+        <a:font script="Tfng" typeface="Ebrima"/>
+      </a:minorFont>
+    </a:fontScheme>
+    <a:fmtScheme name="Office">
+      <a:fillStyleLst>
+        <a:solidFill>
+          <a:schemeClr val="phClr"/>
+        </a:solidFill>
+        <a:gradFill rotWithShape="1">
+          <a:gsLst>
+            <a:gs pos="0">
+              <a:schemeClr val="phClr">
+                <a:lumMod val="110000"/>
+                <a:satMod val="105000"/>
+                <a:tint val="67000"/>
+              </a:schemeClr>
+            </a:gs>
+            <a:gs pos="50000">
+              <a:schemeClr val="phClr">
+                <a:lumMod val="105000"/>
+                <a:satMod val="103000"/>
+                <a:tint val="73000"/>
+              </a:schemeClr>
+            </a:gs>
+            <a:gs pos="100000">
+              <a:schemeClr val="phClr">
+                <a:lumMod val="105000"/>
+                <a:satMod val="109000"/>
+                <a:tint val="81000"/>
+              </a:schemeClr>
+            </a:gs>
+          </a:gsLst>
+          <a:lin ang="5400000" scaled="0"/>
+        </a:gradFill>
+        <a:gradFill rotWithShape="1">
+          <a:gsLst>
+            <a:gs pos="0">
+              <a:schemeClr val="phClr">
+                <a:satMod val="103000"/>
+                <a:lumMod val="102000"/>
+                <a:tint val="94000"/>
+              </a:schemeClr>
+            </a:gs>
+            <a:gs pos="50000">
+              <a:schemeClr val="phClr">
+                <a:satMod val="110000"/>
+                <a:lumMod val="100000"/>
+                <a:shade val="100000"/>
+              </a:schemeClr>
+            </a:gs>
+            <a:gs pos="100000">
+              <a:schemeClr val="phClr">
+                <a:lumMod val="99000"/>
+                <a:satMod val="120000"/>
+                <a:shade val="78000"/>
+              </a:schemeClr>
+            </a:gs>
+          </a:gsLst>
+          <a:lin ang="5400000" scaled="0"/>
+        </a:gradFill>
+      </a:fillStyleLst>
+      <a:lnStyleLst>
+        <a:ln w="12700" cap="flat" cmpd="sng" algn="ctr">
+          <a:solidFill>
+            <a:schemeClr val="phClr"/>
+          </a:solidFill>
+          <a:prstDash val="solid"/>
+          <a:miter lim="800000"/>
+        </a:ln>
+        <a:ln w="19050" cap="flat" cmpd="sng" algn="ctr">
+          <a:solidFill>
+            <a:schemeClr val="phClr"/>
+          </a:solidFill>
+          <a:prstDash val="solid"/>
+          <a:miter lim="800000"/>
+        </a:ln>
+        <a:ln w="25400" cap="flat" cmpd="sng" algn="ctr">
+          <a:solidFill>
+            <a:schemeClr val="phClr"/>
+          </a:solidFill>
+          <a:prstDash val="solid"/>
+          <a:miter lim="800000"/>
+        </a:ln>
+      </a:lnStyleLst>
+      <a:effectStyleLst>
+        <a:effectStyle>
+          <a:effectLst/>
+        </a:effectStyle>
+        <a:effectStyle>
+          <a:effectLst/>
+        </a:effectStyle>
+        <a:effectStyle>
+          <a:effectLst>
+            <a:outerShdw blurRad="57150" dist="19050" dir="5400000" algn="ctr" rotWithShape="0">
+              <a:srgbClr val="000000">
+                <a:alpha val="63000"/>
+              </a:srgbClr>
+            </a:outerShdw>
+          </a:effectLst>
+        </a:effectStyle>
+      </a:effectStyleLst>
+      <a:bgFillStyleLst>
+        <a:solidFill>
+          <a:schemeClr val="phClr"/>
+        </a:solidFill>
+        <a:solidFill>
+          <a:schemeClr val="phClr">
+            <a:tint val="95000"/>
+            <a:satMod val="170000"/>
+          </a:schemeClr>
+        </a:solidFill>
+        <a:gradFill rotWithShape="1">
+          <a:gsLst>
+            <a:gs pos="0">
+              <a:schemeClr val="phClr">
+                <a:tint val="93000"/>
+                <a:satMod val="150000"/>
+                <a:shade val="98000"/>
+                <a:lumMod val="102000"/>
+              </a:schemeClr>
+            </a:gs>
+            <a:gs pos="50000">
+              <a:schemeClr val="phClr">
+                <a:tint val="98000"/>
+                <a:satMod val="130000"/>
+                <a:shade val="90000"/>
+                <a:lumMod val="103000"/>
+              </a:schemeClr>
+            </a:gs>
+            <a:gs pos="100000">
+              <a:schemeClr val="phClr">
+                <a:shade val="63000"/>
+                <a:satMod val="120000"/>
+              </a:schemeClr>
+            </a:gs>
+          </a:gsLst>
+          <a:lin ang="5400000" scaled="0"/>
+        </a:gradFill>
+      </a:bgFillStyleLst>
+    </a:fmtScheme>
+  </a:themeElements>
+  <a:objectDefaults>
+    <a:lnDef>
+      <a:spPr/>
+      <a:bodyPr/>
+      <a:lstStyle/>
+      <a:style>
+        <a:lnRef idx="2">
+          <a:schemeClr val="accent1"/>
+        </a:lnRef>
+        <a:fillRef idx="0">
+          <a:schemeClr val="accent1"/>
+        </a:fillRef>
+        <a:effectRef idx="1">
+          <a:schemeClr val="accent1"/>
+        </a:effectRef>
+        <a:fontRef idx="minor">
+          <a:schemeClr val="tx1"/>
+        </a:fontRef>
+      </a:style>
+    </a:lnDef>
+  </a:objectDefaults>
+  <a:extraClrSchemeLst/>
+  <a:extLst>
+    <a:ext uri="{05A4C25C-085E-4340-85A3-A5531E510DB2}">
+      <thm15:themeFamily xmlns:thm15="http://schemas.microsoft.com/office/thememl/2012/main" name="Office Theme" id="{2E142A2C-CD16-42D6-873A-C26D2A0506FA}" vid="{1BDDFF52-6CD6-40A5-AB3C-68EB2F1E4D0A}"/>
+    </a:ext>
+  </a:extLst>
+</a:theme>
 </file>
</xml_diff>

<commit_message>
v0.0.43: Reformat reply comments - strip date/time, announce as Reply - Author: text
</commit_message>
<xml_diff>
--- a/test_resources/Guide_Dogs_Test_Deck.pptx
+++ b/test_resources/Guide_Dogs_Test_Deck.pptx
@@ -213,6 +213,20 @@
       <pc:sldMk cId="1659357164" sldId="258"/>
     </pc:sldMkLst>
     <p188:pos x="6985000" y="1905000"/>
+    <p188:replyLst>
+      <p188:reply id="{65ECFC6F-75D8-4829-9F72-5ADEFF07451D}" authorId="{B72249CB-3892-C6F4-5165-3FF7AF885C30}" created="2025-12-11T18:30:10.354">
+        <p188:txBody>
+          <a:bodyPr/>
+          <a:lstStyle/>
+          <a:p>
+            <a:r>
+              <a:rPr lang="en-US"/>
+              <a:t>Adding a reply to test </a:t>
+            </a:r>
+          </a:p>
+        </p188:txBody>
+      </p188:reply>
+    </p188:replyLst>
     <p188:txBody>
       <a:bodyPr/>
       <a:lstStyle/>

</xml_diff>

<commit_message>
v0.0.44: Auto-tab from NewCommentButton to first comment on initial pane entry
</commit_message>
<xml_diff>
--- a/test_resources/Guide_Dogs_Test_Deck.pptx
+++ b/test_resources/Guide_Dogs_Test_Deck.pptx
@@ -130,6 +130,27 @@
 </p188:authorLst>
 </file>
 
+<file path=ppt/changesInfos/changesInfo1.xml><?xml version="1.0" encoding="utf-8"?>
+<pc:chgInfo xmlns:a="http://schemas.openxmlformats.org/drawingml/2006/main" xmlns:r="http://schemas.openxmlformats.org/officeDocument/2006/relationships" xmlns:ac="http://schemas.microsoft.com/office/drawing/2013/main/command" xmlns:pc="http://schemas.microsoft.com/office/powerpoint/2013/main/command">
+  <pc:docChgLst>
+    <pc:chgData name="Brett Humphrey" userId="522a63b0-b642-4d4b-b7cc-a758571d848b" providerId="ADAL" clId="{2B68AEAC-0F67-4231-A7ED-716A8537767C}"/>
+    <pc:docChg chg="custSel modSld">
+      <pc:chgData name="Brett Humphrey" userId="522a63b0-b642-4d4b-b7cc-a758571d848b" providerId="ADAL" clId="{2B68AEAC-0F67-4231-A7ED-716A8537767C}" dt="2025-12-11T18:38:00.852" v="78" actId="20577"/>
+      <pc:docMkLst>
+        <pc:docMk/>
+      </pc:docMkLst>
+      <pc:sldChg chg="modNotesTx">
+        <pc:chgData name="Brett Humphrey" userId="522a63b0-b642-4d4b-b7cc-a758571d848b" providerId="ADAL" clId="{2B68AEAC-0F67-4231-A7ED-716A8537767C}" dt="2025-12-11T18:38:00.852" v="78" actId="20577"/>
+        <pc:sldMkLst>
+          <pc:docMk/>
+          <pc:sldMk cId="721691166" sldId="259"/>
+        </pc:sldMkLst>
+      </pc:sldChg>
+    </pc:docChg>
+  </pc:docChgLst>
+</pc:chgInfo>
+</file>
+
 <file path=ppt/comments/modernComment_100_7D152D20.xml><?xml version="1.0" encoding="utf-8"?>
 <p188:cmLst xmlns:a="http://schemas.openxmlformats.org/drawingml/2006/main" xmlns:r="http://schemas.openxmlformats.org/officeDocument/2006/relationships" xmlns:p188="http://schemas.microsoft.com/office/powerpoint/2018/8/main">
   <p188:cm id="{79F52E6E-6063-44A3-B389-7CA9CD1C37E5}" authorId="{53CF2814-E671-958C-F932-8C6424710F6F}" created="2025-12-04T22:37:01.285">
@@ -169,6 +190,18 @@
             <a:r>
               <a:rPr lang="en-US"/>
               <a:t>Stuff to reply </a:t>
+            </a:r>
+          </a:p>
+        </p188:txBody>
+      </p188:reply>
+      <p188:reply id="{6A6CAB1B-EFBF-4E78-B242-81798357EDDE}" authorId="{B72249CB-3892-C6F4-5165-3FF7AF885C30}" created="2025-12-11T18:36:33.338">
+        <p188:txBody>
+          <a:bodyPr/>
+          <a:lstStyle/>
+          <a:p>
+            <a:r>
+              <a:rPr lang="en-US"/>
+              <a:t>Want to reply more here for more testing </a:t>
             </a:r>
           </a:p>
         </p188:txBody>
@@ -826,6 +859,113 @@
     <p:extLst>
       <p:ext uri="{BB962C8B-B14F-4D97-AF65-F5344CB8AC3E}">
         <p14:creationId xmlns:p14="http://schemas.microsoft.com/office/powerpoint/2010/main" val="969289175"/>
+      </p:ext>
+    </p:extLst>
+  </p:cSld>
+  <p:clrMapOvr>
+    <a:masterClrMapping/>
+  </p:clrMapOvr>
+</p:notes>
+</file>
+
+<file path=ppt/notesSlides/notesSlide2.xml><?xml version="1.0" encoding="utf-8"?>
+<p:notes xmlns:a="http://schemas.openxmlformats.org/drawingml/2006/main" xmlns:r="http://schemas.openxmlformats.org/officeDocument/2006/relationships" xmlns:p="http://schemas.openxmlformats.org/presentationml/2006/main">
+  <p:cSld>
+    <p:spTree>
+      <p:nvGrpSpPr>
+        <p:cNvPr id="1" name=""/>
+        <p:cNvGrpSpPr/>
+        <p:nvPr/>
+      </p:nvGrpSpPr>
+      <p:grpSpPr>
+        <a:xfrm>
+          <a:off x="0" y="0"/>
+          <a:ext cx="0" cy="0"/>
+          <a:chOff x="0" y="0"/>
+          <a:chExt cx="0" cy="0"/>
+        </a:xfrm>
+      </p:grpSpPr>
+      <p:sp>
+        <p:nvSpPr>
+          <p:cNvPr id="2" name="Slide Image Placeholder 1"/>
+          <p:cNvSpPr>
+            <a:spLocks noGrp="1" noRot="1" noChangeAspect="1"/>
+          </p:cNvSpPr>
+          <p:nvPr>
+            <p:ph type="sldImg"/>
+          </p:nvPr>
+        </p:nvSpPr>
+        <p:spPr/>
+      </p:sp>
+      <p:sp>
+        <p:nvSpPr>
+          <p:cNvPr id="3" name="Notes Placeholder 2"/>
+          <p:cNvSpPr>
+            <a:spLocks noGrp="1"/>
+          </p:cNvSpPr>
+          <p:nvPr>
+            <p:ph type="body" idx="1"/>
+          </p:nvPr>
+        </p:nvSpPr>
+        <p:spPr/>
+        <p:txBody>
+          <a:bodyPr/>
+          <a:lstStyle/>
+          <a:p>
+            <a:r>
+              <a:rPr lang="en-US" dirty="0"/>
+              <a:t>Putting some </a:t>
+            </a:r>
+            <a:r>
+              <a:rPr lang="en-US" dirty="0" err="1"/>
+              <a:t>stuf</a:t>
+            </a:r>
+            <a:r>
+              <a:rPr lang="en-US" dirty="0"/>
+              <a:t> fin here </a:t>
+            </a:r>
+          </a:p>
+          <a:p>
+            <a:endParaRPr lang="en-US" dirty="0"/>
+          </a:p>
+          <a:p>
+            <a:r>
+              <a:rPr lang="en-US" dirty="0"/>
+              <a:t>Note: this is some notes to me.</a:t>
+            </a:r>
+          </a:p>
+          <a:p>
+            <a:endParaRPr lang="en-US" dirty="0"/>
+          </a:p>
+        </p:txBody>
+      </p:sp>
+      <p:sp>
+        <p:nvSpPr>
+          <p:cNvPr id="4" name="Slide Number Placeholder 3"/>
+          <p:cNvSpPr>
+            <a:spLocks noGrp="1"/>
+          </p:cNvSpPr>
+          <p:nvPr>
+            <p:ph type="sldNum" sz="quarter" idx="5"/>
+          </p:nvPr>
+        </p:nvSpPr>
+        <p:spPr/>
+        <p:txBody>
+          <a:bodyPr/>
+          <a:lstStyle/>
+          <a:p>
+            <a:fld id="{9D2E4F0C-A2D9-473C-B5DC-CA499C91B12F}" type="slidenum">
+              <a:rPr lang="en-US" smtClean="0"/>
+              <a:t>4</a:t>
+            </a:fld>
+            <a:endParaRPr lang="en-US"/>
+          </a:p>
+        </p:txBody>
+      </p:sp>
+    </p:spTree>
+    <p:extLst>
+      <p:ext uri="{BB962C8B-B14F-4D97-AF65-F5344CB8AC3E}">
+        <p14:creationId xmlns:p14="http://schemas.microsoft.com/office/powerpoint/2010/main" val="1090412427"/>
       </p:ext>
     </p:extLst>
   </p:cSld>
@@ -5046,7 +5186,7 @@
   </p:clrMapOvr>
   <p:extLst>
     <p:ext uri="{6950BFC3-D8DA-4A85-94F7-54DA5524770B}">
-      <p188:commentRel xmlns:p188="http://schemas.microsoft.com/office/powerpoint/2018/8/main" r:id="rId2"/>
+      <p188:commentRel xmlns:p188="http://schemas.microsoft.com/office/powerpoint/2018/8/main" r:id="rId3"/>
     </p:ext>
   </p:extLst>
 </p:sld>

</xml_diff>

<commit_message>
v0.0.50: Fix double slide title announcement; strip markers from notes
</commit_message>
<xml_diff>
--- a/test_resources/Guide_Dogs_Test_Deck.pptx
+++ b/test_resources/Guide_Dogs_Test_Deck.pptx
@@ -135,7 +135,7 @@
   <pc:docChgLst>
     <pc:chgData name="Brett Humphrey" userId="522a63b0-b642-4d4b-b7cc-a758571d848b" providerId="ADAL" clId="{2B68AEAC-0F67-4231-A7ED-716A8537767C}"/>
     <pc:docChg chg="custSel modSld">
-      <pc:chgData name="Brett Humphrey" userId="522a63b0-b642-4d4b-b7cc-a758571d848b" providerId="ADAL" clId="{2B68AEAC-0F67-4231-A7ED-716A8537767C}" dt="2025-12-11T18:38:00.852" v="78" actId="20577"/>
+      <pc:chgData name="Brett Humphrey" userId="522a63b0-b642-4d4b-b7cc-a758571d848b" providerId="ADAL" clId="{2B68AEAC-0F67-4231-A7ED-716A8537767C}" dt="2025-12-11T19:57:50.713" v="128" actId="20577"/>
       <pc:docMkLst>
         <pc:docMk/>
       </pc:docMkLst>
@@ -144,6 +144,13 @@
         <pc:sldMkLst>
           <pc:docMk/>
           <pc:sldMk cId="721691166" sldId="259"/>
+        </pc:sldMkLst>
+      </pc:sldChg>
+      <pc:sldChg chg="modNotesTx">
+        <pc:chgData name="Brett Humphrey" userId="522a63b0-b642-4d4b-b7cc-a758571d848b" providerId="ADAL" clId="{2B68AEAC-0F67-4231-A7ED-716A8537767C}" dt="2025-12-11T19:57:50.713" v="128" actId="20577"/>
+        <pc:sldMkLst>
+          <pc:docMk/>
+          <pc:sldMk cId="4197224732" sldId="264"/>
         </pc:sldMkLst>
       </pc:sldChg>
     </pc:docChg>
@@ -966,6 +973,348 @@
     <p:extLst>
       <p:ext uri="{BB962C8B-B14F-4D97-AF65-F5344CB8AC3E}">
         <p14:creationId xmlns:p14="http://schemas.microsoft.com/office/powerpoint/2010/main" val="1090412427"/>
+      </p:ext>
+    </p:extLst>
+  </p:cSld>
+  <p:clrMapOvr>
+    <a:masterClrMapping/>
+  </p:clrMapOvr>
+</p:notes>
+</file>
+
+<file path=ppt/notesSlides/notesSlide3.xml><?xml version="1.0" encoding="utf-8"?>
+<p:notes xmlns:a="http://schemas.openxmlformats.org/drawingml/2006/main" xmlns:r="http://schemas.openxmlformats.org/officeDocument/2006/relationships" xmlns:p="http://schemas.openxmlformats.org/presentationml/2006/main">
+  <p:cSld>
+    <p:spTree>
+      <p:nvGrpSpPr>
+        <p:cNvPr id="1" name=""/>
+        <p:cNvGrpSpPr/>
+        <p:nvPr/>
+      </p:nvGrpSpPr>
+      <p:grpSpPr>
+        <a:xfrm>
+          <a:off x="0" y="0"/>
+          <a:ext cx="0" cy="0"/>
+          <a:chOff x="0" y="0"/>
+          <a:chExt cx="0" cy="0"/>
+        </a:xfrm>
+      </p:grpSpPr>
+      <p:sp>
+        <p:nvSpPr>
+          <p:cNvPr id="2" name="Slide Image Placeholder 1"/>
+          <p:cNvSpPr>
+            <a:spLocks noGrp="1" noRot="1" noChangeAspect="1"/>
+          </p:cNvSpPr>
+          <p:nvPr>
+            <p:ph type="sldImg"/>
+          </p:nvPr>
+        </p:nvSpPr>
+        <p:spPr/>
+      </p:sp>
+      <p:sp>
+        <p:nvSpPr>
+          <p:cNvPr id="3" name="Notes Placeholder 2"/>
+          <p:cNvSpPr>
+            <a:spLocks noGrp="1"/>
+          </p:cNvSpPr>
+          <p:nvPr>
+            <p:ph type="body" idx="1"/>
+          </p:nvPr>
+        </p:nvSpPr>
+        <p:spPr/>
+        <p:txBody>
+          <a:bodyPr/>
+          <a:lstStyle/>
+          <a:p>
+            <a:endParaRPr lang="en-US"/>
+          </a:p>
+        </p:txBody>
+      </p:sp>
+      <p:sp>
+        <p:nvSpPr>
+          <p:cNvPr id="4" name="Slide Number Placeholder 3"/>
+          <p:cNvSpPr>
+            <a:spLocks noGrp="1"/>
+          </p:cNvSpPr>
+          <p:nvPr>
+            <p:ph type="sldNum" sz="quarter" idx="5"/>
+          </p:nvPr>
+        </p:nvSpPr>
+        <p:spPr/>
+        <p:txBody>
+          <a:bodyPr/>
+          <a:lstStyle/>
+          <a:p>
+            <a:fld id="{9D2E4F0C-A2D9-473C-B5DC-CA499C91B12F}" type="slidenum">
+              <a:rPr lang="en-US" smtClean="0"/>
+              <a:t>5</a:t>
+            </a:fld>
+            <a:endParaRPr lang="en-US"/>
+          </a:p>
+        </p:txBody>
+      </p:sp>
+    </p:spTree>
+    <p:extLst>
+      <p:ext uri="{BB962C8B-B14F-4D97-AF65-F5344CB8AC3E}">
+        <p14:creationId xmlns:p14="http://schemas.microsoft.com/office/powerpoint/2010/main" val="419889680"/>
+      </p:ext>
+    </p:extLst>
+  </p:cSld>
+  <p:clrMapOvr>
+    <a:masterClrMapping/>
+  </p:clrMapOvr>
+</p:notes>
+</file>
+
+<file path=ppt/notesSlides/notesSlide4.xml><?xml version="1.0" encoding="utf-8"?>
+<p:notes xmlns:a="http://schemas.openxmlformats.org/drawingml/2006/main" xmlns:r="http://schemas.openxmlformats.org/officeDocument/2006/relationships" xmlns:p="http://schemas.openxmlformats.org/presentationml/2006/main">
+  <p:cSld>
+    <p:spTree>
+      <p:nvGrpSpPr>
+        <p:cNvPr id="1" name=""/>
+        <p:cNvGrpSpPr/>
+        <p:nvPr/>
+      </p:nvGrpSpPr>
+      <p:grpSpPr>
+        <a:xfrm>
+          <a:off x="0" y="0"/>
+          <a:ext cx="0" cy="0"/>
+          <a:chOff x="0" y="0"/>
+          <a:chExt cx="0" cy="0"/>
+        </a:xfrm>
+      </p:grpSpPr>
+      <p:sp>
+        <p:nvSpPr>
+          <p:cNvPr id="2" name="Slide Image Placeholder 1"/>
+          <p:cNvSpPr>
+            <a:spLocks noGrp="1" noRot="1" noChangeAspect="1"/>
+          </p:cNvSpPr>
+          <p:nvPr>
+            <p:ph type="sldImg"/>
+          </p:nvPr>
+        </p:nvSpPr>
+        <p:spPr/>
+      </p:sp>
+      <p:sp>
+        <p:nvSpPr>
+          <p:cNvPr id="3" name="Notes Placeholder 2"/>
+          <p:cNvSpPr>
+            <a:spLocks noGrp="1"/>
+          </p:cNvSpPr>
+          <p:nvPr>
+            <p:ph type="body" idx="1"/>
+          </p:nvPr>
+        </p:nvSpPr>
+        <p:spPr/>
+        <p:txBody>
+          <a:bodyPr/>
+          <a:lstStyle/>
+          <a:p>
+            <a:endParaRPr lang="en-US"/>
+          </a:p>
+        </p:txBody>
+      </p:sp>
+      <p:sp>
+        <p:nvSpPr>
+          <p:cNvPr id="4" name="Slide Number Placeholder 3"/>
+          <p:cNvSpPr>
+            <a:spLocks noGrp="1"/>
+          </p:cNvSpPr>
+          <p:nvPr>
+            <p:ph type="sldNum" sz="quarter" idx="5"/>
+          </p:nvPr>
+        </p:nvSpPr>
+        <p:spPr/>
+        <p:txBody>
+          <a:bodyPr/>
+          <a:lstStyle/>
+          <a:p>
+            <a:fld id="{9D2E4F0C-A2D9-473C-B5DC-CA499C91B12F}" type="slidenum">
+              <a:rPr lang="en-US" smtClean="0"/>
+              <a:t>6</a:t>
+            </a:fld>
+            <a:endParaRPr lang="en-US"/>
+          </a:p>
+        </p:txBody>
+      </p:sp>
+    </p:spTree>
+    <p:extLst>
+      <p:ext uri="{BB962C8B-B14F-4D97-AF65-F5344CB8AC3E}">
+        <p14:creationId xmlns:p14="http://schemas.microsoft.com/office/powerpoint/2010/main" val="2581266795"/>
+      </p:ext>
+    </p:extLst>
+  </p:cSld>
+  <p:clrMapOvr>
+    <a:masterClrMapping/>
+  </p:clrMapOvr>
+</p:notes>
+</file>
+
+<file path=ppt/notesSlides/notesSlide5.xml><?xml version="1.0" encoding="utf-8"?>
+<p:notes xmlns:a="http://schemas.openxmlformats.org/drawingml/2006/main" xmlns:r="http://schemas.openxmlformats.org/officeDocument/2006/relationships" xmlns:p="http://schemas.openxmlformats.org/presentationml/2006/main">
+  <p:cSld>
+    <p:spTree>
+      <p:nvGrpSpPr>
+        <p:cNvPr id="1" name=""/>
+        <p:cNvGrpSpPr/>
+        <p:nvPr/>
+      </p:nvGrpSpPr>
+      <p:grpSpPr>
+        <a:xfrm>
+          <a:off x="0" y="0"/>
+          <a:ext cx="0" cy="0"/>
+          <a:chOff x="0" y="0"/>
+          <a:chExt cx="0" cy="0"/>
+        </a:xfrm>
+      </p:grpSpPr>
+      <p:sp>
+        <p:nvSpPr>
+          <p:cNvPr id="2" name="Slide Image Placeholder 1"/>
+          <p:cNvSpPr>
+            <a:spLocks noGrp="1" noRot="1" noChangeAspect="1"/>
+          </p:cNvSpPr>
+          <p:nvPr>
+            <p:ph type="sldImg"/>
+          </p:nvPr>
+        </p:nvSpPr>
+        <p:spPr/>
+      </p:sp>
+      <p:sp>
+        <p:nvSpPr>
+          <p:cNvPr id="3" name="Notes Placeholder 2"/>
+          <p:cNvSpPr>
+            <a:spLocks noGrp="1"/>
+          </p:cNvSpPr>
+          <p:nvPr>
+            <p:ph type="body" idx="1"/>
+          </p:nvPr>
+        </p:nvSpPr>
+        <p:spPr/>
+        <p:txBody>
+          <a:bodyPr/>
+          <a:lstStyle/>
+          <a:p>
+            <a:endParaRPr lang="en-US"/>
+          </a:p>
+        </p:txBody>
+      </p:sp>
+      <p:sp>
+        <p:nvSpPr>
+          <p:cNvPr id="4" name="Slide Number Placeholder 3"/>
+          <p:cNvSpPr>
+            <a:spLocks noGrp="1"/>
+          </p:cNvSpPr>
+          <p:nvPr>
+            <p:ph type="sldNum" sz="quarter" idx="5"/>
+          </p:nvPr>
+        </p:nvSpPr>
+        <p:spPr/>
+        <p:txBody>
+          <a:bodyPr/>
+          <a:lstStyle/>
+          <a:p>
+            <a:fld id="{9D2E4F0C-A2D9-473C-B5DC-CA499C91B12F}" type="slidenum">
+              <a:rPr lang="en-US" smtClean="0"/>
+              <a:t>8</a:t>
+            </a:fld>
+            <a:endParaRPr lang="en-US"/>
+          </a:p>
+        </p:txBody>
+      </p:sp>
+    </p:spTree>
+    <p:extLst>
+      <p:ext uri="{BB962C8B-B14F-4D97-AF65-F5344CB8AC3E}">
+        <p14:creationId xmlns:p14="http://schemas.microsoft.com/office/powerpoint/2010/main" val="1870533836"/>
+      </p:ext>
+    </p:extLst>
+  </p:cSld>
+  <p:clrMapOvr>
+    <a:masterClrMapping/>
+  </p:clrMapOvr>
+</p:notes>
+</file>
+
+<file path=ppt/notesSlides/notesSlide6.xml><?xml version="1.0" encoding="utf-8"?>
+<p:notes xmlns:a="http://schemas.openxmlformats.org/drawingml/2006/main" xmlns:r="http://schemas.openxmlformats.org/officeDocument/2006/relationships" xmlns:p="http://schemas.openxmlformats.org/presentationml/2006/main">
+  <p:cSld>
+    <p:spTree>
+      <p:nvGrpSpPr>
+        <p:cNvPr id="1" name=""/>
+        <p:cNvGrpSpPr/>
+        <p:nvPr/>
+      </p:nvGrpSpPr>
+      <p:grpSpPr>
+        <a:xfrm>
+          <a:off x="0" y="0"/>
+          <a:ext cx="0" cy="0"/>
+          <a:chOff x="0" y="0"/>
+          <a:chExt cx="0" cy="0"/>
+        </a:xfrm>
+      </p:grpSpPr>
+      <p:sp>
+        <p:nvSpPr>
+          <p:cNvPr id="2" name="Slide Image Placeholder 1"/>
+          <p:cNvSpPr>
+            <a:spLocks noGrp="1" noRot="1" noChangeAspect="1"/>
+          </p:cNvSpPr>
+          <p:nvPr>
+            <p:ph type="sldImg"/>
+          </p:nvPr>
+        </p:nvSpPr>
+        <p:spPr/>
+      </p:sp>
+      <p:sp>
+        <p:nvSpPr>
+          <p:cNvPr id="3" name="Notes Placeholder 2"/>
+          <p:cNvSpPr>
+            <a:spLocks noGrp="1"/>
+          </p:cNvSpPr>
+          <p:nvPr>
+            <p:ph type="body" idx="1"/>
+          </p:nvPr>
+        </p:nvSpPr>
+        <p:spPr/>
+        <p:txBody>
+          <a:bodyPr/>
+          <a:lstStyle/>
+          <a:p>
+            <a:r>
+              <a:rPr lang="en-US" dirty="0"/>
+              <a:t>**** stuff to read out ****</a:t>
+            </a:r>
+          </a:p>
+          <a:p>
+            <a:endParaRPr lang="en-US" dirty="0"/>
+          </a:p>
+        </p:txBody>
+      </p:sp>
+      <p:sp>
+        <p:nvSpPr>
+          <p:cNvPr id="4" name="Slide Number Placeholder 3"/>
+          <p:cNvSpPr>
+            <a:spLocks noGrp="1"/>
+          </p:cNvSpPr>
+          <p:nvPr>
+            <p:ph type="sldNum" sz="quarter" idx="5"/>
+          </p:nvPr>
+        </p:nvSpPr>
+        <p:spPr/>
+        <p:txBody>
+          <a:bodyPr/>
+          <a:lstStyle/>
+          <a:p>
+            <a:fld id="{9D2E4F0C-A2D9-473C-B5DC-CA499C91B12F}" type="slidenum">
+              <a:rPr lang="en-US" smtClean="0"/>
+              <a:t>9</a:t>
+            </a:fld>
+            <a:endParaRPr lang="en-US"/>
+          </a:p>
+        </p:txBody>
+      </p:sp>
+    </p:spTree>
+    <p:extLst>
+      <p:ext uri="{BB962C8B-B14F-4D97-AF65-F5344CB8AC3E}">
+        <p14:creationId xmlns:p14="http://schemas.microsoft.com/office/powerpoint/2010/main" val="1634984478"/>
       </p:ext>
     </p:extLst>
   </p:cSld>
@@ -5281,7 +5630,7 @@
   </p:clrMapOvr>
   <p:extLst>
     <p:ext uri="{6950BFC3-D8DA-4A85-94F7-54DA5524770B}">
-      <p188:commentRel xmlns:p188="http://schemas.microsoft.com/office/powerpoint/2018/8/main" r:id="rId2"/>
+      <p188:commentRel xmlns:p188="http://schemas.microsoft.com/office/powerpoint/2018/8/main" r:id="rId3"/>
     </p:ext>
   </p:extLst>
 </p:sld>
@@ -5564,7 +5913,7 @@
   </p:clrMapOvr>
   <p:extLst>
     <p:ext uri="{6950BFC3-D8DA-4A85-94F7-54DA5524770B}">
-      <p188:commentRel xmlns:p188="http://schemas.microsoft.com/office/powerpoint/2018/8/main" r:id="rId2"/>
+      <p188:commentRel xmlns:p188="http://schemas.microsoft.com/office/powerpoint/2018/8/main" r:id="rId3"/>
     </p:ext>
   </p:extLst>
 </p:sld>
@@ -5657,7 +6006,7 @@
   </p:clrMapOvr>
   <p:extLst>
     <p:ext uri="{6950BFC3-D8DA-4A85-94F7-54DA5524770B}">
-      <p188:commentRel xmlns:p188="http://schemas.microsoft.com/office/powerpoint/2018/8/main" r:id="rId2"/>
+      <p188:commentRel xmlns:p188="http://schemas.microsoft.com/office/powerpoint/2018/8/main" r:id="rId3"/>
     </p:ext>
   </p:extLst>
 </p:sld>

</xml_diff>

<commit_message>
v0.0.51: Remove Notes: prefix from notes reading
- Don't say 'Notes:' prefix when user presses Ctrl+Alt+N (they know they asked for notes)
- Shorten 'No notes on this slide' to just 'No notes'
</commit_message>
<xml_diff>
--- a/test_resources/Guide_Dogs_Test_Deck.pptx
+++ b/test_resources/Guide_Dogs_Test_Deck.pptx
@@ -135,7 +135,7 @@
   <pc:docChgLst>
     <pc:chgData name="Brett Humphrey" userId="522a63b0-b642-4d4b-b7cc-a758571d848b" providerId="ADAL" clId="{2B68AEAC-0F67-4231-A7ED-716A8537767C}"/>
     <pc:docChg chg="custSel modSld">
-      <pc:chgData name="Brett Humphrey" userId="522a63b0-b642-4d4b-b7cc-a758571d848b" providerId="ADAL" clId="{2B68AEAC-0F67-4231-A7ED-716A8537767C}" dt="2025-12-11T19:57:50.713" v="128" actId="20577"/>
+      <pc:chgData name="Brett Humphrey" userId="522a63b0-b642-4d4b-b7cc-a758571d848b" providerId="ADAL" clId="{2B68AEAC-0F67-4231-A7ED-716A8537767C}" dt="2025-12-11T20:07:07.758" v="161" actId="20577"/>
       <pc:docMkLst>
         <pc:docMk/>
       </pc:docMkLst>
@@ -144,6 +144,20 @@
         <pc:sldMkLst>
           <pc:docMk/>
           <pc:sldMk cId="721691166" sldId="259"/>
+        </pc:sldMkLst>
+      </pc:sldChg>
+      <pc:sldChg chg="modNotesTx">
+        <pc:chgData name="Brett Humphrey" userId="522a63b0-b642-4d4b-b7cc-a758571d848b" providerId="ADAL" clId="{2B68AEAC-0F67-4231-A7ED-716A8537767C}" dt="2025-12-11T20:06:35.757" v="130" actId="20577"/>
+        <pc:sldMkLst>
+          <pc:docMk/>
+          <pc:sldMk cId="4209332740" sldId="261"/>
+        </pc:sldMkLst>
+      </pc:sldChg>
+      <pc:sldChg chg="modNotesTx">
+        <pc:chgData name="Brett Humphrey" userId="522a63b0-b642-4d4b-b7cc-a758571d848b" providerId="ADAL" clId="{2B68AEAC-0F67-4231-A7ED-716A8537767C}" dt="2025-12-11T20:07:07.758" v="161" actId="20577"/>
+        <pc:sldMkLst>
+          <pc:docMk/>
+          <pc:sldMk cId="4078999270" sldId="263"/>
         </pc:sldMkLst>
       </pc:sldChg>
       <pc:sldChg chg="modNotesTx">
@@ -919,30 +933,7 @@
           <a:bodyPr/>
           <a:lstStyle/>
           <a:p>
-            <a:r>
-              <a:rPr lang="en-US" dirty="0"/>
-              <a:t>Putting some </a:t>
-            </a:r>
-            <a:r>
-              <a:rPr lang="en-US" dirty="0" err="1"/>
-              <a:t>stuf</a:t>
-            </a:r>
-            <a:r>
-              <a:rPr lang="en-US" dirty="0"/>
-              <a:t> fin here </a:t>
-            </a:r>
-          </a:p>
-          <a:p>
-            <a:endParaRPr lang="en-US" dirty="0"/>
-          </a:p>
-          <a:p>
-            <a:r>
-              <a:rPr lang="en-US" dirty="0"/>
-              <a:t>Note: this is some notes to me.</a:t>
-            </a:r>
-          </a:p>
-          <a:p>
-            <a:endParaRPr lang="en-US" dirty="0"/>
+            <a:endParaRPr lang="en-US"/>
           </a:p>
         </p:txBody>
       </p:sp>
@@ -963,7 +954,7 @@
           <a:p>
             <a:fld id="{9D2E4F0C-A2D9-473C-B5DC-CA499C91B12F}" type="slidenum">
               <a:rPr lang="en-US" smtClean="0"/>
-              <a:t>4</a:t>
+              <a:t>3</a:t>
             </a:fld>
             <a:endParaRPr lang="en-US"/>
           </a:p>
@@ -972,7 +963,7 @@
     </p:spTree>
     <p:extLst>
       <p:ext uri="{BB962C8B-B14F-4D97-AF65-F5344CB8AC3E}">
-        <p14:creationId xmlns:p14="http://schemas.microsoft.com/office/powerpoint/2010/main" val="1090412427"/>
+        <p14:creationId xmlns:p14="http://schemas.microsoft.com/office/powerpoint/2010/main" val="3401277628"/>
       </p:ext>
     </p:extLst>
   </p:cSld>
@@ -1026,7 +1017,30 @@
           <a:bodyPr/>
           <a:lstStyle/>
           <a:p>
-            <a:endParaRPr lang="en-US"/>
+            <a:r>
+              <a:rPr lang="en-US" dirty="0"/>
+              <a:t>Putting some </a:t>
+            </a:r>
+            <a:r>
+              <a:rPr lang="en-US" dirty="0" err="1"/>
+              <a:t>stuf</a:t>
+            </a:r>
+            <a:r>
+              <a:rPr lang="en-US" dirty="0"/>
+              <a:t> fin here </a:t>
+            </a:r>
+          </a:p>
+          <a:p>
+            <a:endParaRPr lang="en-US" dirty="0"/>
+          </a:p>
+          <a:p>
+            <a:r>
+              <a:rPr lang="en-US" dirty="0"/>
+              <a:t>Note: this is some notes to me.</a:t>
+            </a:r>
+          </a:p>
+          <a:p>
+            <a:endParaRPr lang="en-US" dirty="0"/>
           </a:p>
         </p:txBody>
       </p:sp>
@@ -1047,7 +1061,7 @@
           <a:p>
             <a:fld id="{9D2E4F0C-A2D9-473C-B5DC-CA499C91B12F}" type="slidenum">
               <a:rPr lang="en-US" smtClean="0"/>
-              <a:t>5</a:t>
+              <a:t>4</a:t>
             </a:fld>
             <a:endParaRPr lang="en-US"/>
           </a:p>
@@ -1056,7 +1070,7 @@
     </p:spTree>
     <p:extLst>
       <p:ext uri="{BB962C8B-B14F-4D97-AF65-F5344CB8AC3E}">
-        <p14:creationId xmlns:p14="http://schemas.microsoft.com/office/powerpoint/2010/main" val="419889680"/>
+        <p14:creationId xmlns:p14="http://schemas.microsoft.com/office/powerpoint/2010/main" val="1090412427"/>
       </p:ext>
     </p:extLst>
   </p:cSld>
@@ -1131,7 +1145,7 @@
           <a:p>
             <a:fld id="{9D2E4F0C-A2D9-473C-B5DC-CA499C91B12F}" type="slidenum">
               <a:rPr lang="en-US" smtClean="0"/>
-              <a:t>6</a:t>
+              <a:t>5</a:t>
             </a:fld>
             <a:endParaRPr lang="en-US"/>
           </a:p>
@@ -1140,7 +1154,7 @@
     </p:spTree>
     <p:extLst>
       <p:ext uri="{BB962C8B-B14F-4D97-AF65-F5344CB8AC3E}">
-        <p14:creationId xmlns:p14="http://schemas.microsoft.com/office/powerpoint/2010/main" val="2581266795"/>
+        <p14:creationId xmlns:p14="http://schemas.microsoft.com/office/powerpoint/2010/main" val="419889680"/>
       </p:ext>
     </p:extLst>
   </p:cSld>
@@ -1194,7 +1208,178 @@
           <a:bodyPr/>
           <a:lstStyle/>
           <a:p>
+            <a:endParaRPr lang="en-US" dirty="0"/>
+          </a:p>
+        </p:txBody>
+      </p:sp>
+      <p:sp>
+        <p:nvSpPr>
+          <p:cNvPr id="4" name="Slide Number Placeholder 3"/>
+          <p:cNvSpPr>
+            <a:spLocks noGrp="1"/>
+          </p:cNvSpPr>
+          <p:nvPr>
+            <p:ph type="sldNum" sz="quarter" idx="5"/>
+          </p:nvPr>
+        </p:nvSpPr>
+        <p:spPr/>
+        <p:txBody>
+          <a:bodyPr/>
+          <a:lstStyle/>
+          <a:p>
+            <a:fld id="{9D2E4F0C-A2D9-473C-B5DC-CA499C91B12F}" type="slidenum">
+              <a:rPr lang="en-US" smtClean="0"/>
+              <a:t>6</a:t>
+            </a:fld>
             <a:endParaRPr lang="en-US"/>
+          </a:p>
+        </p:txBody>
+      </p:sp>
+    </p:spTree>
+    <p:extLst>
+      <p:ext uri="{BB962C8B-B14F-4D97-AF65-F5344CB8AC3E}">
+        <p14:creationId xmlns:p14="http://schemas.microsoft.com/office/powerpoint/2010/main" val="2581266795"/>
+      </p:ext>
+    </p:extLst>
+  </p:cSld>
+  <p:clrMapOvr>
+    <a:masterClrMapping/>
+  </p:clrMapOvr>
+</p:notes>
+</file>
+
+<file path=ppt/notesSlides/notesSlide6.xml><?xml version="1.0" encoding="utf-8"?>
+<p:notes xmlns:a="http://schemas.openxmlformats.org/drawingml/2006/main" xmlns:r="http://schemas.openxmlformats.org/officeDocument/2006/relationships" xmlns:p="http://schemas.openxmlformats.org/presentationml/2006/main">
+  <p:cSld>
+    <p:spTree>
+      <p:nvGrpSpPr>
+        <p:cNvPr id="1" name=""/>
+        <p:cNvGrpSpPr/>
+        <p:nvPr/>
+      </p:nvGrpSpPr>
+      <p:grpSpPr>
+        <a:xfrm>
+          <a:off x="0" y="0"/>
+          <a:ext cx="0" cy="0"/>
+          <a:chOff x="0" y="0"/>
+          <a:chExt cx="0" cy="0"/>
+        </a:xfrm>
+      </p:grpSpPr>
+      <p:sp>
+        <p:nvSpPr>
+          <p:cNvPr id="2" name="Slide Image Placeholder 1"/>
+          <p:cNvSpPr>
+            <a:spLocks noGrp="1" noRot="1" noChangeAspect="1"/>
+          </p:cNvSpPr>
+          <p:nvPr>
+            <p:ph type="sldImg"/>
+          </p:nvPr>
+        </p:nvSpPr>
+        <p:spPr/>
+      </p:sp>
+      <p:sp>
+        <p:nvSpPr>
+          <p:cNvPr id="3" name="Notes Placeholder 2"/>
+          <p:cNvSpPr>
+            <a:spLocks noGrp="1"/>
+          </p:cNvSpPr>
+          <p:nvPr>
+            <p:ph type="body" idx="1"/>
+          </p:nvPr>
+        </p:nvSpPr>
+        <p:spPr/>
+        <p:txBody>
+          <a:bodyPr/>
+          <a:lstStyle/>
+          <a:p>
+            <a:endParaRPr lang="en-US"/>
+          </a:p>
+        </p:txBody>
+      </p:sp>
+      <p:sp>
+        <p:nvSpPr>
+          <p:cNvPr id="4" name="Slide Number Placeholder 3"/>
+          <p:cNvSpPr>
+            <a:spLocks noGrp="1"/>
+          </p:cNvSpPr>
+          <p:nvPr>
+            <p:ph type="sldNum" sz="quarter" idx="5"/>
+          </p:nvPr>
+        </p:nvSpPr>
+        <p:spPr/>
+        <p:txBody>
+          <a:bodyPr/>
+          <a:lstStyle/>
+          <a:p>
+            <a:fld id="{9D2E4F0C-A2D9-473C-B5DC-CA499C91B12F}" type="slidenum">
+              <a:rPr lang="en-US" smtClean="0"/>
+              <a:t>7</a:t>
+            </a:fld>
+            <a:endParaRPr lang="en-US"/>
+          </a:p>
+        </p:txBody>
+      </p:sp>
+    </p:spTree>
+    <p:extLst>
+      <p:ext uri="{BB962C8B-B14F-4D97-AF65-F5344CB8AC3E}">
+        <p14:creationId xmlns:p14="http://schemas.microsoft.com/office/powerpoint/2010/main" val="1376278860"/>
+      </p:ext>
+    </p:extLst>
+  </p:cSld>
+  <p:clrMapOvr>
+    <a:masterClrMapping/>
+  </p:clrMapOvr>
+</p:notes>
+</file>
+
+<file path=ppt/notesSlides/notesSlide7.xml><?xml version="1.0" encoding="utf-8"?>
+<p:notes xmlns:a="http://schemas.openxmlformats.org/drawingml/2006/main" xmlns:r="http://schemas.openxmlformats.org/officeDocument/2006/relationships" xmlns:p="http://schemas.openxmlformats.org/presentationml/2006/main">
+  <p:cSld>
+    <p:spTree>
+      <p:nvGrpSpPr>
+        <p:cNvPr id="1" name=""/>
+        <p:cNvGrpSpPr/>
+        <p:nvPr/>
+      </p:nvGrpSpPr>
+      <p:grpSpPr>
+        <a:xfrm>
+          <a:off x="0" y="0"/>
+          <a:ext cx="0" cy="0"/>
+          <a:chOff x="0" y="0"/>
+          <a:chExt cx="0" cy="0"/>
+        </a:xfrm>
+      </p:grpSpPr>
+      <p:sp>
+        <p:nvSpPr>
+          <p:cNvPr id="2" name="Slide Image Placeholder 1"/>
+          <p:cNvSpPr>
+            <a:spLocks noGrp="1" noRot="1" noChangeAspect="1"/>
+          </p:cNvSpPr>
+          <p:nvPr>
+            <p:ph type="sldImg"/>
+          </p:nvPr>
+        </p:nvSpPr>
+        <p:spPr/>
+      </p:sp>
+      <p:sp>
+        <p:nvSpPr>
+          <p:cNvPr id="3" name="Notes Placeholder 2"/>
+          <p:cNvSpPr>
+            <a:spLocks noGrp="1"/>
+          </p:cNvSpPr>
+          <p:nvPr>
+            <p:ph type="body" idx="1"/>
+          </p:nvPr>
+        </p:nvSpPr>
+        <p:spPr/>
+        <p:txBody>
+          <a:bodyPr/>
+          <a:lstStyle/>
+          <a:p>
+            <a:r>
+              <a:rPr lang="en-US" dirty="0"/>
+              <a:t>**** thins to talk about ****</a:t>
+            </a:r>
           </a:p>
         </p:txBody>
       </p:sp>
@@ -1234,7 +1419,7 @@
 </p:notes>
 </file>
 
-<file path=ppt/notesSlides/notesSlide6.xml><?xml version="1.0" encoding="utf-8"?>
+<file path=ppt/notesSlides/notesSlide8.xml><?xml version="1.0" encoding="utf-8"?>
 <p:notes xmlns:a="http://schemas.openxmlformats.org/drawingml/2006/main" xmlns:r="http://schemas.openxmlformats.org/officeDocument/2006/relationships" xmlns:p="http://schemas.openxmlformats.org/presentationml/2006/main">
   <p:cSld>
     <p:spTree>
@@ -5435,7 +5620,7 @@
   </p:clrMapOvr>
   <p:extLst>
     <p:ext uri="{6950BFC3-D8DA-4A85-94F7-54DA5524770B}">
-      <p188:commentRel xmlns:p188="http://schemas.microsoft.com/office/powerpoint/2018/8/main" r:id="rId2"/>
+      <p188:commentRel xmlns:p188="http://schemas.microsoft.com/office/powerpoint/2018/8/main" r:id="rId3"/>
     </p:ext>
   </p:extLst>
 </p:sld>
@@ -5817,7 +6002,7 @@
   </p:clrMapOvr>
   <p:extLst>
     <p:ext uri="{6950BFC3-D8DA-4A85-94F7-54DA5524770B}">
-      <p188:commentRel xmlns:p188="http://schemas.microsoft.com/office/powerpoint/2018/8/main" r:id="rId2"/>
+      <p188:commentRel xmlns:p188="http://schemas.microsoft.com/office/powerpoint/2018/8/main" r:id="rId3"/>
     </p:ext>
   </p:extLst>
 </p:sld>

</xml_diff>

<commit_message>
v0.0.64: Fix NotesPage access for slideshow slide objects
PROBLEM (v0.0.63):
AttributeError: 'Slide' object has no attribute 'NotesPage'

During slideshow, self.currentSlide is a SlideShowView.Slide object, not a
regular Slide object. The SlideShowView.Slide doesn't have NotesPage directly.

SOLUTION:
Access the underlying Slide object via currentSlide.Parent, which DOES have
the NotesPage property.

CHANGE:
Line 1114: slide = self.currentSlide.Parent
Line 1115: notes_page = slide.NotesPage

This gets us the actual Slide object from the slideshow slide wrapper.

VERIFIED:
v0.0.63 logs showed the error on every slide change. v0.0.64 should successfully
access notes and detect **** markers.
</commit_message>
<xml_diff>
--- a/test_resources/Guide_Dogs_Test_Deck.pptx
+++ b/test_resources/Guide_Dogs_Test_Deck.pptx
@@ -135,7 +135,7 @@
   <pc:docChgLst>
     <pc:chgData name="Brett Humphrey" userId="522a63b0-b642-4d4b-b7cc-a758571d848b" providerId="ADAL" clId="{2B68AEAC-0F67-4231-A7ED-716A8537767C}"/>
     <pc:docChg chg="undo custSel modSld">
-      <pc:chgData name="Brett Humphrey" userId="522a63b0-b642-4d4b-b7cc-a758571d848b" providerId="ADAL" clId="{2B68AEAC-0F67-4231-A7ED-716A8537767C}" dt="2025-12-12T18:11:09.026" v="644" actId="313"/>
+      <pc:chgData name="Brett Humphrey" userId="522a63b0-b642-4d4b-b7cc-a758571d848b" providerId="ADAL" clId="{2B68AEAC-0F67-4231-A7ED-716A8537767C}" dt="2025-12-13T14:27:22.195" v="674" actId="20577"/>
       <pc:docMkLst>
         <pc:docMk/>
       </pc:docMkLst>
@@ -147,7 +147,7 @@
         </pc:sldMkLst>
       </pc:sldChg>
       <pc:sldChg chg="modNotesTx">
-        <pc:chgData name="Brett Humphrey" userId="522a63b0-b642-4d4b-b7cc-a758571d848b" providerId="ADAL" clId="{2B68AEAC-0F67-4231-A7ED-716A8537767C}" dt="2025-12-11T18:38:00.852" v="78" actId="20577"/>
+        <pc:chgData name="Brett Humphrey" userId="522a63b0-b642-4d4b-b7cc-a758571d848b" providerId="ADAL" clId="{2B68AEAC-0F67-4231-A7ED-716A8537767C}" dt="2025-12-13T14:27:22.195" v="674" actId="20577"/>
         <pc:sldMkLst>
           <pc:docMk/>
           <pc:sldMk cId="721691166" sldId="259"/>
@@ -545,7 +545,7 @@
           <a:p>
             <a:fld id="{583F1CBD-96CF-4072-8DC3-C715CAA4EC76}" type="datetimeFigureOut">
               <a:rPr lang="en-US" smtClean="0"/>
-              <a:t>12/11/2025</a:t>
+              <a:t>12/13/2025</a:t>
             </a:fld>
             <a:endParaRPr lang="en-US"/>
           </a:p>
@@ -1150,8 +1150,19 @@
           <a:p>
             <a:r>
               <a:rPr lang="en-US" dirty="0"/>
-              <a:t>Note: this is some notes to me.</a:t>
-            </a:r>
+              <a:t>**** notes to me </a:t>
+            </a:r>
+            <a:r>
+              <a:rPr lang="en-US"/>
+              <a:t>when presenting </a:t>
+            </a:r>
+          </a:p>
+          <a:p>
+            <a:r>
+              <a:rPr lang="en-US"/>
+              <a:t>****</a:t>
+            </a:r>
+            <a:endParaRPr lang="en-US" dirty="0"/>
           </a:p>
           <a:p>
             <a:endParaRPr lang="en-US" dirty="0"/>
@@ -1779,7 +1790,7 @@
           <a:p>
             <a:fld id="{09EEBB50-B7EB-44BE-9779-AC849BD321CB}" type="datetimeFigureOut">
               <a:rPr lang="en-US" smtClean="0"/>
-              <a:t>12/11/2025</a:t>
+              <a:t>12/13/2025</a:t>
             </a:fld>
             <a:endParaRPr lang="en-US"/>
           </a:p>
@@ -1977,7 +1988,7 @@
           <a:p>
             <a:fld id="{09EEBB50-B7EB-44BE-9779-AC849BD321CB}" type="datetimeFigureOut">
               <a:rPr lang="en-US" smtClean="0"/>
-              <a:t>12/11/2025</a:t>
+              <a:t>12/13/2025</a:t>
             </a:fld>
             <a:endParaRPr lang="en-US"/>
           </a:p>
@@ -2185,7 +2196,7 @@
           <a:p>
             <a:fld id="{09EEBB50-B7EB-44BE-9779-AC849BD321CB}" type="datetimeFigureOut">
               <a:rPr lang="en-US" smtClean="0"/>
-              <a:t>12/11/2025</a:t>
+              <a:t>12/13/2025</a:t>
             </a:fld>
             <a:endParaRPr lang="en-US"/>
           </a:p>
@@ -2383,7 +2394,7 @@
           <a:p>
             <a:fld id="{09EEBB50-B7EB-44BE-9779-AC849BD321CB}" type="datetimeFigureOut">
               <a:rPr lang="en-US" smtClean="0"/>
-              <a:t>12/11/2025</a:t>
+              <a:t>12/13/2025</a:t>
             </a:fld>
             <a:endParaRPr lang="en-US"/>
           </a:p>
@@ -2581,7 +2592,7 @@
           <a:p>
             <a:fld id="{09EEBB50-B7EB-44BE-9779-AC849BD321CB}" type="datetimeFigureOut">
               <a:rPr lang="en-US" smtClean="0"/>
-              <a:t>12/11/2025</a:t>
+              <a:t>12/13/2025</a:t>
             </a:fld>
             <a:endParaRPr lang="en-US"/>
           </a:p>
@@ -2856,7 +2867,7 @@
           <a:p>
             <a:fld id="{09EEBB50-B7EB-44BE-9779-AC849BD321CB}" type="datetimeFigureOut">
               <a:rPr lang="en-US" smtClean="0"/>
-              <a:t>12/11/2025</a:t>
+              <a:t>12/13/2025</a:t>
             </a:fld>
             <a:endParaRPr lang="en-US"/>
           </a:p>
@@ -3121,7 +3132,7 @@
           <a:p>
             <a:fld id="{09EEBB50-B7EB-44BE-9779-AC849BD321CB}" type="datetimeFigureOut">
               <a:rPr lang="en-US" smtClean="0"/>
-              <a:t>12/11/2025</a:t>
+              <a:t>12/13/2025</a:t>
             </a:fld>
             <a:endParaRPr lang="en-US"/>
           </a:p>
@@ -3533,7 +3544,7 @@
           <a:p>
             <a:fld id="{09EEBB50-B7EB-44BE-9779-AC849BD321CB}" type="datetimeFigureOut">
               <a:rPr lang="en-US" smtClean="0"/>
-              <a:t>12/11/2025</a:t>
+              <a:t>12/13/2025</a:t>
             </a:fld>
             <a:endParaRPr lang="en-US"/>
           </a:p>
@@ -3674,7 +3685,7 @@
           <a:p>
             <a:fld id="{09EEBB50-B7EB-44BE-9779-AC849BD321CB}" type="datetimeFigureOut">
               <a:rPr lang="en-US" smtClean="0"/>
-              <a:t>12/11/2025</a:t>
+              <a:t>12/13/2025</a:t>
             </a:fld>
             <a:endParaRPr lang="en-US"/>
           </a:p>
@@ -3787,7 +3798,7 @@
           <a:p>
             <a:fld id="{09EEBB50-B7EB-44BE-9779-AC849BD321CB}" type="datetimeFigureOut">
               <a:rPr lang="en-US" smtClean="0"/>
-              <a:t>12/11/2025</a:t>
+              <a:t>12/13/2025</a:t>
             </a:fld>
             <a:endParaRPr lang="en-US"/>
           </a:p>
@@ -4098,7 +4109,7 @@
           <a:p>
             <a:fld id="{09EEBB50-B7EB-44BE-9779-AC849BD321CB}" type="datetimeFigureOut">
               <a:rPr lang="en-US" smtClean="0"/>
-              <a:t>12/11/2025</a:t>
+              <a:t>12/13/2025</a:t>
             </a:fld>
             <a:endParaRPr lang="en-US"/>
           </a:p>
@@ -4386,7 +4397,7 @@
           <a:p>
             <a:fld id="{09EEBB50-B7EB-44BE-9779-AC849BD321CB}" type="datetimeFigureOut">
               <a:rPr lang="en-US" smtClean="0"/>
-              <a:t>12/11/2025</a:t>
+              <a:t>12/13/2025</a:t>
             </a:fld>
             <a:endParaRPr lang="en-US"/>
           </a:p>
@@ -4627,7 +4638,7 @@
           <a:p>
             <a:fld id="{09EEBB50-B7EB-44BE-9779-AC849BD321CB}" type="datetimeFigureOut">
               <a:rPr lang="en-US" smtClean="0"/>
-              <a:t>12/11/2025</a:t>
+              <a:t>12/13/2025</a:t>
             </a:fld>
             <a:endParaRPr lang="en-US"/>
           </a:p>

</xml_diff>